<commit_message>
removed gui and added documentation
</commit_message>
<xml_diff>
--- a/Summary.pptx
+++ b/Summary.pptx
@@ -1105,10 +1105,24 @@
     <dgm:pt modelId="{2C3BB413-378E-4DB8-B348-DC351F4378D1}" type="pres">
       <dgm:prSet presAssocID="{8912E075-5CD2-4357-8FA3-E3CBA3DBB7AC}" presName="sibTrans" presStyleLbl="sibTrans2D1" presStyleIdx="0" presStyleCnt="4" custScaleY="2000000"/>
       <dgm:spPr/>
+      <dgm:t>
+        <a:bodyPr/>
+        <a:lstStyle/>
+        <a:p>
+          <a:endParaRPr lang="en-US"/>
+        </a:p>
+      </dgm:t>
     </dgm:pt>
     <dgm:pt modelId="{8AC90A50-8750-49A9-8EB8-5DCE1CE127DF}" type="pres">
       <dgm:prSet presAssocID="{8912E075-5CD2-4357-8FA3-E3CBA3DBB7AC}" presName="connectorText" presStyleLbl="sibTrans2D1" presStyleIdx="0" presStyleCnt="4"/>
       <dgm:spPr/>
+      <dgm:t>
+        <a:bodyPr/>
+        <a:lstStyle/>
+        <a:p>
+          <a:endParaRPr lang="en-US"/>
+        </a:p>
+      </dgm:t>
     </dgm:pt>
     <dgm:pt modelId="{15996852-9055-48B1-84D3-F3667FBE2433}" type="pres">
       <dgm:prSet presAssocID="{C56D9B7E-4AF0-40F8-A2EB-73C0E4748936}" presName="node" presStyleLbl="node1" presStyleIdx="1" presStyleCnt="5" custScaleX="2000000" custScaleY="2000000" custLinFactX="-800000" custLinFactY="1832723" custLinFactNeighborX="-810399" custLinFactNeighborY="1900000">
@@ -1128,10 +1142,24 @@
     <dgm:pt modelId="{405074F7-4C6F-4014-84FC-E7263BD31D23}" type="pres">
       <dgm:prSet presAssocID="{60FC33DE-3566-4941-8533-CF8EF0A300D3}" presName="sibTrans" presStyleLbl="sibTrans2D1" presStyleIdx="1" presStyleCnt="4" custScaleY="2000000"/>
       <dgm:spPr/>
+      <dgm:t>
+        <a:bodyPr/>
+        <a:lstStyle/>
+        <a:p>
+          <a:endParaRPr lang="en-US"/>
+        </a:p>
+      </dgm:t>
     </dgm:pt>
     <dgm:pt modelId="{20B22EE4-3AA1-4FD4-97E7-C0058B810DBF}" type="pres">
       <dgm:prSet presAssocID="{60FC33DE-3566-4941-8533-CF8EF0A300D3}" presName="connectorText" presStyleLbl="sibTrans2D1" presStyleIdx="1" presStyleCnt="4"/>
       <dgm:spPr/>
+      <dgm:t>
+        <a:bodyPr/>
+        <a:lstStyle/>
+        <a:p>
+          <a:endParaRPr lang="en-US"/>
+        </a:p>
+      </dgm:t>
     </dgm:pt>
     <dgm:pt modelId="{80760593-2009-478A-AE38-B6C399635123}" type="pres">
       <dgm:prSet presAssocID="{6AD73FB8-CA09-4267-B8B3-158307A6BDF7}" presName="node" presStyleLbl="node1" presStyleIdx="2" presStyleCnt="5" custScaleX="2000000" custScaleY="2000000" custLinFactX="-800000" custLinFactY="3572001" custLinFactNeighborX="-810400" custLinFactNeighborY="3600000">
@@ -1151,10 +1179,24 @@
     <dgm:pt modelId="{9CCADC28-0608-4F63-B2F6-32C3EB542511}" type="pres">
       <dgm:prSet presAssocID="{3918F183-C383-4E6C-919A-2D39B102F547}" presName="sibTrans" presStyleLbl="sibTrans2D1" presStyleIdx="2" presStyleCnt="4" custScaleY="2000000"/>
       <dgm:spPr/>
+      <dgm:t>
+        <a:bodyPr/>
+        <a:lstStyle/>
+        <a:p>
+          <a:endParaRPr lang="en-US"/>
+        </a:p>
+      </dgm:t>
     </dgm:pt>
     <dgm:pt modelId="{CA632BFE-0DC0-42D2-91B9-CB0288BFD683}" type="pres">
       <dgm:prSet presAssocID="{3918F183-C383-4E6C-919A-2D39B102F547}" presName="connectorText" presStyleLbl="sibTrans2D1" presStyleIdx="2" presStyleCnt="4"/>
       <dgm:spPr/>
+      <dgm:t>
+        <a:bodyPr/>
+        <a:lstStyle/>
+        <a:p>
+          <a:endParaRPr lang="en-US"/>
+        </a:p>
+      </dgm:t>
     </dgm:pt>
     <dgm:pt modelId="{8B1455B4-02E8-416F-9073-E8B77831D27E}" type="pres">
       <dgm:prSet presAssocID="{B3A9F056-9AAB-430E-AF08-3E76C7B74D8A}" presName="node" presStyleLbl="node1" presStyleIdx="3" presStyleCnt="5" custScaleX="2000000" custScaleY="2000000" custLinFactX="750818" custLinFactY="1467020" custLinFactNeighborX="800000" custLinFactNeighborY="1500000">
@@ -1174,10 +1216,24 @@
     <dgm:pt modelId="{370FF9E3-2EA8-4239-BB8A-02B73814B3CE}" type="pres">
       <dgm:prSet presAssocID="{FF19CFD1-1C9B-4E54-901E-0CD22A682356}" presName="sibTrans" presStyleLbl="sibTrans2D1" presStyleIdx="3" presStyleCnt="4" custScaleY="2000000"/>
       <dgm:spPr/>
+      <dgm:t>
+        <a:bodyPr/>
+        <a:lstStyle/>
+        <a:p>
+          <a:endParaRPr lang="en-US"/>
+        </a:p>
+      </dgm:t>
     </dgm:pt>
     <dgm:pt modelId="{D6EF5153-1186-426F-ADD0-C02BF9AE68DD}" type="pres">
       <dgm:prSet presAssocID="{FF19CFD1-1C9B-4E54-901E-0CD22A682356}" presName="connectorText" presStyleLbl="sibTrans2D1" presStyleIdx="3" presStyleCnt="4"/>
       <dgm:spPr/>
+      <dgm:t>
+        <a:bodyPr/>
+        <a:lstStyle/>
+        <a:p>
+          <a:endParaRPr lang="en-US"/>
+        </a:p>
+      </dgm:t>
     </dgm:pt>
     <dgm:pt modelId="{4EE27D1F-A00F-44A7-889C-E2764C63957E}" type="pres">
       <dgm:prSet presAssocID="{90164B17-91D3-49AB-9C1C-B61D1C637D9F}" presName="node" presStyleLbl="node1" presStyleIdx="4" presStyleCnt="5" custScaleX="2000000" custScaleY="2000000" custLinFactX="750819" custLinFactY="-4829526" custLinFactNeighborX="800000" custLinFactNeighborY="-4900000">
@@ -1196,8 +1252,8 @@
     </dgm:pt>
   </dgm:ptLst>
   <dgm:cxnLst>
+    <dgm:cxn modelId="{4C9A8D67-8044-4CF5-9F55-396D21F137E4}" type="presOf" srcId="{FF19CFD1-1C9B-4E54-901E-0CD22A682356}" destId="{370FF9E3-2EA8-4239-BB8A-02B73814B3CE}" srcOrd="0" destOrd="0" presId="urn:microsoft.com/office/officeart/2005/8/layout/process2"/>
     <dgm:cxn modelId="{476C8795-F309-4630-A775-31CDAC07735D}" type="presOf" srcId="{8912E075-5CD2-4357-8FA3-E3CBA3DBB7AC}" destId="{2C3BB413-378E-4DB8-B348-DC351F4378D1}" srcOrd="0" destOrd="0" presId="urn:microsoft.com/office/officeart/2005/8/layout/process2"/>
-    <dgm:cxn modelId="{4C9A8D67-8044-4CF5-9F55-396D21F137E4}" type="presOf" srcId="{FF19CFD1-1C9B-4E54-901E-0CD22A682356}" destId="{370FF9E3-2EA8-4239-BB8A-02B73814B3CE}" srcOrd="0" destOrd="0" presId="urn:microsoft.com/office/officeart/2005/8/layout/process2"/>
     <dgm:cxn modelId="{6C1BABF3-E036-428A-BC54-1D41986F6B44}" type="presOf" srcId="{60FC33DE-3566-4941-8533-CF8EF0A300D3}" destId="{20B22EE4-3AA1-4FD4-97E7-C0058B810DBF}" srcOrd="1" destOrd="0" presId="urn:microsoft.com/office/officeart/2005/8/layout/process2"/>
     <dgm:cxn modelId="{8C416902-6DD1-4ACC-97F2-A6F07F4164FD}" srcId="{1840898A-7BE4-4B05-9C8A-A2DD36AF9699}" destId="{90164B17-91D3-49AB-9C1C-B61D1C637D9F}" srcOrd="4" destOrd="0" parTransId="{DB16EFD5-AEB3-410C-A7BD-F63B0E237141}" sibTransId="{A367610C-6D4A-437D-AE0B-C2CF2119AEA0}"/>
     <dgm:cxn modelId="{E4B7F429-2FFF-44A0-9E69-5CE8BDF8ADCD}" type="presOf" srcId="{60FC33DE-3566-4941-8533-CF8EF0A300D3}" destId="{405074F7-4C6F-4014-84FC-E7263BD31D23}" srcOrd="0" destOrd="0" presId="urn:microsoft.com/office/officeart/2005/8/layout/process2"/>
@@ -6265,8 +6321,16 @@
               <a:t>Eran</a:t>
             </a:r>
             <a:r>
-              <a:rPr lang="en-US" dirty="0" smtClean="0"/>
-              <a:t> Goldstein</a:t>
+              <a:rPr lang="en-US" smtClean="0"/>
+              <a:t> </a:t>
+            </a:r>
+            <a:r>
+              <a:rPr lang="en-US" smtClean="0"/>
+              <a:t>Goldstein </a:t>
+            </a:r>
+            <a:r>
+              <a:rPr lang="en-US"/>
+              <a:t>204607485</a:t>
             </a:r>
             <a:endParaRPr lang="en-US" dirty="0"/>
           </a:p>

</xml_diff>